<commit_message>
For Bug 36035 70425 Update translations of layouts and templates of Slide masters for tr-TR template
</commit_message>
<xml_diff>
--- a/new/tr-TR/new.pptx
+++ b/new/tr-TR/new.pptx
@@ -562,7 +562,7 @@
 
 <file path=ppt/slideLayouts/slideLayout1.xml><?xml version="1.0" encoding="utf-8"?>
 <p:sldLayout xmlns:a="http://schemas.openxmlformats.org/drawingml/2006/main" xmlns:r="http://schemas.openxmlformats.org/officeDocument/2006/relationships" xmlns:p="http://schemas.openxmlformats.org/presentationml/2006/main" type="title" preserve="1">
-  <p:cSld name="Title Slide">
+  <p:cSld name="Başlık Slaydı">
     <p:spTree>
       <p:nvGrpSpPr>
         <p:cNvPr id="1" name=""/>
@@ -754,7 +754,7 @@
 
 <file path=ppt/slideLayouts/slideLayout10.xml><?xml version="1.0" encoding="utf-8"?>
 <p:sldLayout xmlns:a="http://schemas.openxmlformats.org/drawingml/2006/main" xmlns:r="http://schemas.openxmlformats.org/officeDocument/2006/relationships" xmlns:p="http://schemas.openxmlformats.org/presentationml/2006/main" type="vertTx" preserve="1">
-  <p:cSld name="Title and Vertical Text">
+  <p:cSld name="Başlık, Dikey Metin">
     <p:spTree>
       <p:nvGrpSpPr>
         <p:cNvPr id="1" name=""/>
@@ -924,7 +924,7 @@
 
 <file path=ppt/slideLayouts/slideLayout11.xml><?xml version="1.0" encoding="utf-8"?>
 <p:sldLayout xmlns:a="http://schemas.openxmlformats.org/drawingml/2006/main" xmlns:r="http://schemas.openxmlformats.org/officeDocument/2006/relationships" xmlns:p="http://schemas.openxmlformats.org/presentationml/2006/main" type="vertTitleAndTx" preserve="1">
-  <p:cSld name="Vertical Title and Text">
+  <p:cSld name="Dikey Başlık ve Metin">
     <p:spTree>
       <p:nvGrpSpPr>
         <p:cNvPr id="1" name=""/>
@@ -1104,7 +1104,7 @@
 
 <file path=ppt/slideLayouts/slideLayout2.xml><?xml version="1.0" encoding="utf-8"?>
 <p:sldLayout xmlns:a="http://schemas.openxmlformats.org/drawingml/2006/main" xmlns:r="http://schemas.openxmlformats.org/officeDocument/2006/relationships" xmlns:p="http://schemas.openxmlformats.org/presentationml/2006/main" type="obj" preserve="1">
-  <p:cSld name="Title and Content">
+  <p:cSld name="Başlık ve İçerik">
     <p:spTree>
       <p:nvGrpSpPr>
         <p:cNvPr id="1" name=""/>
@@ -1274,7 +1274,7 @@
 
 <file path=ppt/slideLayouts/slideLayout3.xml><?xml version="1.0" encoding="utf-8"?>
 <p:sldLayout xmlns:a="http://schemas.openxmlformats.org/drawingml/2006/main" xmlns:r="http://schemas.openxmlformats.org/officeDocument/2006/relationships" xmlns:p="http://schemas.openxmlformats.org/presentationml/2006/main" type="secHead" preserve="1">
-  <p:cSld name="Section Header">
+  <p:cSld name="Bölüm Üstbilgisi">
     <p:spTree>
       <p:nvGrpSpPr>
         <p:cNvPr id="1" name=""/>
@@ -1520,7 +1520,7 @@
 
 <file path=ppt/slideLayouts/slideLayout4.xml><?xml version="1.0" encoding="utf-8"?>
 <p:sldLayout xmlns:a="http://schemas.openxmlformats.org/drawingml/2006/main" xmlns:r="http://schemas.openxmlformats.org/officeDocument/2006/relationships" xmlns:p="http://schemas.openxmlformats.org/presentationml/2006/main" type="twoObj" preserve="1">
-  <p:cSld name="Two Content">
+  <p:cSld name="İki İçerik">
     <p:spTree>
       <p:nvGrpSpPr>
         <p:cNvPr id="1" name=""/>
@@ -1537,7 +1537,7 @@
       </p:grpSpPr>
       <p:sp>
         <p:nvSpPr>
-          <p:cNvPr id="2" name="Title 1"/>
+          <p:cNvPr id="2" name="Başlık 1"/>
           <p:cNvSpPr>
             <a:spLocks noGrp="1"/>
           </p:cNvSpPr>
@@ -1752,7 +1752,7 @@
 
 <file path=ppt/slideLayouts/slideLayout5.xml><?xml version="1.0" encoding="utf-8"?>
 <p:sldLayout xmlns:a="http://schemas.openxmlformats.org/drawingml/2006/main" xmlns:r="http://schemas.openxmlformats.org/officeDocument/2006/relationships" xmlns:p="http://schemas.openxmlformats.org/presentationml/2006/main" type="twoTxTwoObj" preserve="1">
-  <p:cSld name="Comparison">
+  <p:cSld name="Karşılaştırma">
     <p:spTree>
       <p:nvGrpSpPr>
         <p:cNvPr id="1" name=""/>
@@ -2119,7 +2119,7 @@
 
 <file path=ppt/slideLayouts/slideLayout6.xml><?xml version="1.0" encoding="utf-8"?>
 <p:sldLayout xmlns:a="http://schemas.openxmlformats.org/drawingml/2006/main" xmlns:r="http://schemas.openxmlformats.org/officeDocument/2006/relationships" xmlns:p="http://schemas.openxmlformats.org/presentationml/2006/main" type="titleOnly" preserve="1">
-  <p:cSld name="Title Only">
+  <p:cSld name="Yalnızca Başlık">
     <p:spTree>
       <p:nvGrpSpPr>
         <p:cNvPr id="1" name=""/>
@@ -2237,7 +2237,7 @@
 
 <file path=ppt/slideLayouts/slideLayout7.xml><?xml version="1.0" encoding="utf-8"?>
 <p:sldLayout xmlns:a="http://schemas.openxmlformats.org/drawingml/2006/main" xmlns:r="http://schemas.openxmlformats.org/officeDocument/2006/relationships" xmlns:p="http://schemas.openxmlformats.org/presentationml/2006/main" type="blank" preserve="1">
-  <p:cSld name="Blank">
+  <p:cSld name="Boş">
     <p:spTree>
       <p:nvGrpSpPr>
         <p:cNvPr id="1" name=""/>
@@ -2332,7 +2332,7 @@
 
 <file path=ppt/slideLayouts/slideLayout8.xml><?xml version="1.0" encoding="utf-8"?>
 <p:sldLayout xmlns:a="http://schemas.openxmlformats.org/drawingml/2006/main" xmlns:r="http://schemas.openxmlformats.org/officeDocument/2006/relationships" xmlns:p="http://schemas.openxmlformats.org/presentationml/2006/main" type="objTx" preserve="1">
-  <p:cSld name="Content with Caption">
+  <p:cSld name="Başlıklı İçerik">
     <p:spTree>
       <p:nvGrpSpPr>
         <p:cNvPr id="1" name=""/>
@@ -2609,7 +2609,7 @@
 
 <file path=ppt/slideLayouts/slideLayout9.xml><?xml version="1.0" encoding="utf-8"?>
 <p:sldLayout xmlns:a="http://schemas.openxmlformats.org/drawingml/2006/main" xmlns:r="http://schemas.openxmlformats.org/officeDocument/2006/relationships" xmlns:p="http://schemas.openxmlformats.org/presentationml/2006/main" type="picTx" preserve="1">
-  <p:cSld name="Picture with Caption">
+  <p:cSld name="Başlıklı Resim">
     <p:spTree>
       <p:nvGrpSpPr>
         <p:cNvPr id="1" name=""/>
@@ -2715,7 +2715,7 @@
           <a:p>
             <a:r>
               <a:rPr lang="tr-TR" smtClean="0"/>
-              <a:t>Click icon to add picture</a:t>
+              <a:t>Resim eklemek için simgeye tıklayın</a:t>
             </a:r>
             <a:endParaRPr lang="tr-TR" dirty="0"/>
           </a:p>
@@ -2788,7 +2788,7 @@
       </p:sp>
       <p:sp>
         <p:nvSpPr>
-          <p:cNvPr id="5" name="Date Placeholder 4"/>
+          <p:cNvPr id="5" name="Veri Yer Tutucusu 4"/>
           <p:cNvSpPr>
             <a:spLocks noGrp="1"/>
           </p:cNvSpPr>

</xml_diff>